<commit_message>
clean up the images
</commit_message>
<xml_diff>
--- a/assets/CH_assets/diagrams.pptx
+++ b/assets/CH_assets/diagrams.pptx
@@ -3582,7 +3582,7 @@
         </p:nvSpPr>
         <p:spPr>
           <a:xfrm rot="10109841">
-            <a:off x="4186317" y="2463949"/>
+            <a:off x="4241874" y="2356908"/>
             <a:ext cx="1757642" cy="1254196"/>
           </a:xfrm>
           <a:prstGeom prst="arc">
@@ -3595,10 +3595,10 @@
             <a:solidFill>
               <a:schemeClr val="accent2"/>
             </a:solidFill>
-            <a:prstDash val="dash"/>
+            <a:prstDash val="sysDot"/>
             <a:round/>
-            <a:headEnd type="arrow" w="med" len="med"/>
-            <a:tailEnd type="arrow" w="med" len="med"/>
+            <a:headEnd type="stealth" w="med" len="med"/>
+            <a:tailEnd type="stealth" w="med" len="med"/>
           </a:ln>
         </p:spPr>
         <p:style>
@@ -3638,8 +3638,8 @@
         </p:nvSpPr>
         <p:spPr>
           <a:xfrm>
-            <a:off x="4384665" y="3063185"/>
-            <a:ext cx="736031" cy="335340"/>
+            <a:off x="3968039" y="3625296"/>
+            <a:ext cx="641805" cy="369332"/>
           </a:xfrm>
           <a:prstGeom prst="rect">
             <a:avLst/>
@@ -3657,7 +3657,7 @@
           <a:lstStyle/>
           <a:p>
             <a:r>
-              <a:rPr lang="en-US" b="1" dirty="0"/>
+              <a:rPr lang="en-US" dirty="0"/>
               <a:t>FOV</a:t>
             </a:r>
           </a:p>
@@ -3687,10 +3687,10 @@
             <a:solidFill>
               <a:schemeClr val="accent2"/>
             </a:solidFill>
-            <a:prstDash val="dash"/>
+            <a:prstDash val="sysDot"/>
             <a:round/>
             <a:headEnd type="none" w="med" len="med"/>
-            <a:tailEnd type="arrow" w="med" len="med"/>
+            <a:tailEnd type="triangle" w="med" len="med"/>
           </a:ln>
         </p:spPr>
         <p:style>
@@ -3860,10 +3860,10 @@
             <a:solidFill>
               <a:srgbClr val="00B0F0"/>
             </a:solidFill>
-            <a:prstDash val="dash"/>
+            <a:prstDash val="sysDot"/>
             <a:round/>
             <a:headEnd type="none" w="med" len="med"/>
-            <a:tailEnd type="arrow" w="med" len="med"/>
+            <a:tailEnd type="stealth" w="med" len="med"/>
           </a:ln>
         </p:spPr>
         <p:style>
@@ -3942,15 +3942,15 @@
         </p:nvCxnSpPr>
         <p:spPr>
           <a:xfrm>
-            <a:off x="7219525" y="1469985"/>
-            <a:ext cx="1" cy="4158980"/>
+            <a:off x="7183145" y="1554908"/>
+            <a:ext cx="0" cy="4063448"/>
           </a:xfrm>
           <a:prstGeom prst="straightConnector1">
             <a:avLst/>
           </a:prstGeom>
           <a:ln w="53975">
             <a:headEnd type="triangle"/>
-            <a:tailEnd type="triangle"/>
+            <a:tailEnd type="none"/>
           </a:ln>
         </p:spPr>
         <p:style>
@@ -4278,6 +4278,47 @@
           </p:txBody>
         </p:sp>
       </p:grpSp>
+      <p:cxnSp>
+        <p:nvCxnSpPr>
+          <p:cNvPr id="3" name="Straight Connector 2">
+            <a:extLst>
+              <a:ext uri="{FF2B5EF4-FFF2-40B4-BE49-F238E27FC236}">
+                <a16:creationId xmlns:a16="http://schemas.microsoft.com/office/drawing/2014/main" id="{B9404FCF-1667-D376-F43D-5E599FF4F083}"/>
+              </a:ext>
+            </a:extLst>
+          </p:cNvPr>
+          <p:cNvCxnSpPr>
+            <a:cxnSpLocks/>
+          </p:cNvCxnSpPr>
+          <p:nvPr/>
+        </p:nvCxnSpPr>
+        <p:spPr>
+          <a:xfrm flipH="1">
+            <a:off x="5932707" y="1534588"/>
+            <a:ext cx="1265802" cy="0"/>
+          </a:xfrm>
+          <a:prstGeom prst="line">
+            <a:avLst/>
+          </a:prstGeom>
+          <a:ln>
+            <a:prstDash val="sysDot"/>
+          </a:ln>
+        </p:spPr>
+        <p:style>
+          <a:lnRef idx="2">
+            <a:schemeClr val="accent1"/>
+          </a:lnRef>
+          <a:fillRef idx="0">
+            <a:schemeClr val="accent1"/>
+          </a:fillRef>
+          <a:effectRef idx="1">
+            <a:schemeClr val="accent1"/>
+          </a:effectRef>
+          <a:fontRef idx="minor">
+            <a:schemeClr val="tx1"/>
+          </a:fontRef>
+        </p:style>
+      </p:cxnSp>
     </p:spTree>
     <p:extLst>
       <p:ext uri="{BB962C8B-B14F-4D97-AF65-F5344CB8AC3E}">
@@ -4379,7 +4420,7 @@
         </p:nvCxnSpPr>
         <p:spPr>
           <a:xfrm>
-            <a:off x="3046562" y="5287680"/>
+            <a:off x="3851367" y="5287680"/>
             <a:ext cx="5876619" cy="0"/>
           </a:xfrm>
           <a:prstGeom prst="line">
@@ -4588,10 +4629,10 @@
             <a:solidFill>
               <a:schemeClr val="accent2"/>
             </a:solidFill>
-            <a:prstDash val="dash"/>
+            <a:prstDash val="sysDot"/>
             <a:round/>
-            <a:headEnd type="arrow" w="med" len="med"/>
-            <a:tailEnd type="arrow" w="med" len="med"/>
+            <a:headEnd type="stealth" w="med" len="med"/>
+            <a:tailEnd type="stealth" w="med" len="med"/>
           </a:ln>
         </p:spPr>
         <p:style>
@@ -4631,8 +4672,8 @@
         </p:nvSpPr>
         <p:spPr>
           <a:xfrm>
-            <a:off x="4884923" y="4012141"/>
-            <a:ext cx="652957" cy="297492"/>
+            <a:off x="4957905" y="4094350"/>
+            <a:ext cx="652957" cy="369332"/>
           </a:xfrm>
           <a:prstGeom prst="rect">
             <a:avLst/>
@@ -4650,7 +4691,7 @@
           <a:lstStyle/>
           <a:p>
             <a:r>
-              <a:rPr lang="en-US" b="1" dirty="0"/>
+              <a:rPr lang="en-US" dirty="0"/>
               <a:t>FOV</a:t>
             </a:r>
           </a:p>
@@ -4670,20 +4711,20 @@
         </p:nvSpPr>
         <p:spPr>
           <a:xfrm rot="8165887">
-            <a:off x="6211145" y="3297756"/>
+            <a:off x="6220922" y="3536682"/>
             <a:ext cx="408334" cy="483680"/>
           </a:xfrm>
           <a:prstGeom prst="arc">
             <a:avLst>
-              <a:gd name="adj1" fmla="val 16414287"/>
+              <a:gd name="adj1" fmla="val 16974302"/>
               <a:gd name="adj2" fmla="val 0"/>
             </a:avLst>
           </a:prstGeom>
-          <a:ln w="38100" cap="flat" cmpd="sng" algn="ctr">
+          <a:ln w="19050" cap="flat" cmpd="sng" algn="ctr">
             <a:solidFill>
               <a:schemeClr val="accent2"/>
             </a:solidFill>
-            <a:prstDash val="solid"/>
+            <a:prstDash val="sysDot"/>
             <a:round/>
             <a:headEnd type="none" w="lg" len="sm"/>
             <a:tailEnd type="stealth" w="med" len="med"/>
@@ -4726,7 +4767,7 @@
         </p:nvSpPr>
         <p:spPr>
           <a:xfrm>
-            <a:off x="6783488" y="3532665"/>
+            <a:off x="6601219" y="3537050"/>
             <a:ext cx="1765951" cy="369332"/>
           </a:xfrm>
           <a:prstGeom prst="rect">
@@ -4849,7 +4890,7 @@
         </p:nvCxnSpPr>
         <p:spPr>
           <a:xfrm>
-            <a:off x="8860635" y="1597306"/>
+            <a:off x="9572694" y="1617909"/>
             <a:ext cx="1" cy="3689569"/>
           </a:xfrm>
           <a:prstGeom prst="straightConnector1">
@@ -4857,7 +4898,7 @@
           </a:prstGeom>
           <a:ln w="53975">
             <a:headEnd type="triangle"/>
-            <a:tailEnd type="triangle"/>
+            <a:tailEnd type="none"/>
           </a:ln>
         </p:spPr>
         <p:style>
@@ -4889,7 +4930,7 @@
         </p:nvSpPr>
         <p:spPr>
           <a:xfrm>
-            <a:off x="7973426" y="2228397"/>
+            <a:off x="8634936" y="1826286"/>
             <a:ext cx="1081298" cy="297492"/>
           </a:xfrm>
           <a:prstGeom prst="rect">
@@ -5185,6 +5226,140 @@
           </p:txBody>
         </p:sp>
       </p:grpSp>
+      <p:sp>
+        <p:nvSpPr>
+          <p:cNvPr id="3" name="Arc 2">
+            <a:extLst>
+              <a:ext uri="{FF2B5EF4-FFF2-40B4-BE49-F238E27FC236}">
+                <a16:creationId xmlns:a16="http://schemas.microsoft.com/office/drawing/2014/main" id="{BFD23D12-DB4E-19BF-845B-2FEA7B74C8BE}"/>
+              </a:ext>
+            </a:extLst>
+          </p:cNvPr>
+          <p:cNvSpPr/>
+          <p:nvPr/>
+        </p:nvSpPr>
+        <p:spPr>
+          <a:xfrm rot="8866385">
+            <a:off x="6490108" y="4542597"/>
+            <a:ext cx="599138" cy="332245"/>
+          </a:xfrm>
+          <a:prstGeom prst="arc">
+            <a:avLst>
+              <a:gd name="adj1" fmla="val 17312687"/>
+              <a:gd name="adj2" fmla="val 0"/>
+            </a:avLst>
+          </a:prstGeom>
+          <a:ln w="19050" cap="flat" cmpd="sng" algn="ctr">
+            <a:solidFill>
+              <a:schemeClr val="accent2"/>
+            </a:solidFill>
+            <a:prstDash val="sysDot"/>
+            <a:round/>
+            <a:headEnd type="stealth" w="med" len="med"/>
+            <a:tailEnd type="none" w="med" len="med"/>
+          </a:ln>
+        </p:spPr>
+        <p:style>
+          <a:lnRef idx="0">
+            <a:scrgbClr r="0" g="0" b="0"/>
+          </a:lnRef>
+          <a:fillRef idx="0">
+            <a:scrgbClr r="0" g="0" b="0"/>
+          </a:fillRef>
+          <a:effectRef idx="0">
+            <a:scrgbClr r="0" g="0" b="0"/>
+          </a:effectRef>
+          <a:fontRef idx="minor">
+            <a:schemeClr val="tx1"/>
+          </a:fontRef>
+        </p:style>
+        <p:txBody>
+          <a:bodyPr rtlCol="0" anchor="ctr"/>
+          <a:lstStyle/>
+          <a:p>
+            <a:pPr algn="ctr"/>
+            <a:endParaRPr lang="en-US"/>
+          </a:p>
+        </p:txBody>
+      </p:sp>
+      <p:sp>
+        <p:nvSpPr>
+          <p:cNvPr id="6" name="TextBox 5">
+            <a:extLst>
+              <a:ext uri="{FF2B5EF4-FFF2-40B4-BE49-F238E27FC236}">
+                <a16:creationId xmlns:a16="http://schemas.microsoft.com/office/drawing/2014/main" id="{3464C87A-DDD2-B415-2DBC-48D64E56C2F1}"/>
+              </a:ext>
+            </a:extLst>
+          </p:cNvPr>
+          <p:cNvSpPr txBox="1"/>
+          <p:nvPr/>
+        </p:nvSpPr>
+        <p:spPr>
+          <a:xfrm>
+            <a:off x="6906676" y="4708991"/>
+            <a:ext cx="2465732" cy="369332"/>
+          </a:xfrm>
+          <a:prstGeom prst="rect">
+            <a:avLst/>
+          </a:prstGeom>
+          <a:solidFill>
+            <a:schemeClr val="bg2"/>
+          </a:solidFill>
+        </p:spPr>
+        <p:txBody>
+          <a:bodyPr wrap="square">
+            <a:spAutoFit/>
+          </a:bodyPr>
+          <a:lstStyle/>
+          <a:p>
+            <a:r>
+              <a:rPr lang="en-US" dirty="0"/>
+              <a:t>FOV/2 - Camera_angle</a:t>
+            </a:r>
+          </a:p>
+        </p:txBody>
+      </p:sp>
+      <p:cxnSp>
+        <p:nvCxnSpPr>
+          <p:cNvPr id="7" name="Straight Connector 6">
+            <a:extLst>
+              <a:ext uri="{FF2B5EF4-FFF2-40B4-BE49-F238E27FC236}">
+                <a16:creationId xmlns:a16="http://schemas.microsoft.com/office/drawing/2014/main" id="{E3F1C663-C6A2-01D7-0F4D-D4D75FAB0CEA}"/>
+              </a:ext>
+            </a:extLst>
+          </p:cNvPr>
+          <p:cNvCxnSpPr>
+            <a:cxnSpLocks/>
+          </p:cNvCxnSpPr>
+          <p:nvPr/>
+        </p:nvCxnSpPr>
+        <p:spPr>
+          <a:xfrm flipH="1">
+            <a:off x="6498783" y="1597306"/>
+            <a:ext cx="3073911" cy="0"/>
+          </a:xfrm>
+          <a:prstGeom prst="line">
+            <a:avLst/>
+          </a:prstGeom>
+          <a:ln>
+            <a:prstDash val="sysDot"/>
+          </a:ln>
+        </p:spPr>
+        <p:style>
+          <a:lnRef idx="2">
+            <a:schemeClr val="accent1"/>
+          </a:lnRef>
+          <a:fillRef idx="0">
+            <a:schemeClr val="accent1"/>
+          </a:fillRef>
+          <a:effectRef idx="1">
+            <a:schemeClr val="accent1"/>
+          </a:effectRef>
+          <a:fontRef idx="minor">
+            <a:schemeClr val="tx1"/>
+          </a:fontRef>
+        </p:style>
+      </p:cxnSp>
     </p:spTree>
     <p:extLst>
       <p:ext uri="{BB962C8B-B14F-4D97-AF65-F5344CB8AC3E}">

</xml_diff>

<commit_message>
addressed issues mentioned in the pull requests comments
- For the function compute_distance_between_images_with_angel() in src/plan_computation.py, changed the reduced formula using sin() and cos() back to its original form using tan() because that may be clearer to future readers.
- Moved fov() to src/camera_utils.py
- In main.ipynb, simplified the test code for non-nadir photos to print results for few selected angles.
- In main.ipynb, added text describing the implications of the various test cases such as increasing height and reducing overlap. Also combined the two test cases for reducing focal length because there is only one focal length instead of two independent focal lengths.
- Slight touch up with the diagrams.
</commit_message>
<xml_diff>
--- a/assets/CH_assets/diagrams.pptx
+++ b/assets/CH_assets/diagrams.pptx
@@ -4401,7 +4401,7 @@
             </a:solidFill>
             <a:prstDash val="sysDot"/>
             <a:round/>
-            <a:headEnd type="none" w="med" len="med"/>
+            <a:headEnd type="stealth" w="med" len="med"/>
             <a:tailEnd type="stealth" w="med" len="med"/>
           </a:ln>
         </p:spPr>
@@ -4862,9 +4862,9 @@
           <p:nvPr/>
         </p:nvSpPr>
         <p:spPr>
-          <a:xfrm rot="7825112">
-            <a:off x="6174383" y="4006416"/>
-            <a:ext cx="412125" cy="463136"/>
+          <a:xfrm rot="7237497">
+            <a:off x="6194098" y="3970158"/>
+            <a:ext cx="307606" cy="540765"/>
           </a:xfrm>
           <a:prstGeom prst="arc">
             <a:avLst>
@@ -4878,7 +4878,7 @@
             </a:solidFill>
             <a:prstDash val="sysDot"/>
             <a:round/>
-            <a:headEnd type="none" w="lg" len="sm"/>
+            <a:headEnd type="stealth" w="med" len="med"/>
             <a:tailEnd type="stealth" w="med" len="med"/>
           </a:ln>
         </p:spPr>
@@ -5587,7 +5587,7 @@
             <a:prstDash val="sysDot"/>
             <a:round/>
             <a:headEnd type="stealth" w="med" len="med"/>
-            <a:tailEnd type="none" w="med" len="med"/>
+            <a:tailEnd type="stealth" w="med" len="med"/>
           </a:ln>
         </p:spPr>
         <p:style>

</xml_diff>

<commit_message>
added comment and adjusted diagrams
- added comments for the data models from the notebook.
- minor adjustment for the diagrams.
</commit_message>
<xml_diff>
--- a/assets/CH_assets/diagrams.pptx
+++ b/assets/CH_assets/diagrams.pptx
@@ -260,7 +260,7 @@
           <a:p>
             <a:fld id="{546F6BE1-E150-4405-AD34-6C987C8B2B3E}" type="datetimeFigureOut">
               <a:rPr lang="en-US" smtClean="0"/>
-              <a:t>4/10/2025</a:t>
+              <a:t>4/12/2025</a:t>
             </a:fld>
             <a:endParaRPr lang="en-US"/>
           </a:p>
@@ -458,7 +458,7 @@
           <a:p>
             <a:fld id="{546F6BE1-E150-4405-AD34-6C987C8B2B3E}" type="datetimeFigureOut">
               <a:rPr lang="en-US" smtClean="0"/>
-              <a:t>4/10/2025</a:t>
+              <a:t>4/12/2025</a:t>
             </a:fld>
             <a:endParaRPr lang="en-US"/>
           </a:p>
@@ -666,7 +666,7 @@
           <a:p>
             <a:fld id="{546F6BE1-E150-4405-AD34-6C987C8B2B3E}" type="datetimeFigureOut">
               <a:rPr lang="en-US" smtClean="0"/>
-              <a:t>4/10/2025</a:t>
+              <a:t>4/12/2025</a:t>
             </a:fld>
             <a:endParaRPr lang="en-US"/>
           </a:p>
@@ -864,7 +864,7 @@
           <a:p>
             <a:fld id="{546F6BE1-E150-4405-AD34-6C987C8B2B3E}" type="datetimeFigureOut">
               <a:rPr lang="en-US" smtClean="0"/>
-              <a:t>4/10/2025</a:t>
+              <a:t>4/12/2025</a:t>
             </a:fld>
             <a:endParaRPr lang="en-US"/>
           </a:p>
@@ -1139,7 +1139,7 @@
           <a:p>
             <a:fld id="{546F6BE1-E150-4405-AD34-6C987C8B2B3E}" type="datetimeFigureOut">
               <a:rPr lang="en-US" smtClean="0"/>
-              <a:t>4/10/2025</a:t>
+              <a:t>4/12/2025</a:t>
             </a:fld>
             <a:endParaRPr lang="en-US"/>
           </a:p>
@@ -1404,7 +1404,7 @@
           <a:p>
             <a:fld id="{546F6BE1-E150-4405-AD34-6C987C8B2B3E}" type="datetimeFigureOut">
               <a:rPr lang="en-US" smtClean="0"/>
-              <a:t>4/10/2025</a:t>
+              <a:t>4/12/2025</a:t>
             </a:fld>
             <a:endParaRPr lang="en-US"/>
           </a:p>
@@ -1816,7 +1816,7 @@
           <a:p>
             <a:fld id="{546F6BE1-E150-4405-AD34-6C987C8B2B3E}" type="datetimeFigureOut">
               <a:rPr lang="en-US" smtClean="0"/>
-              <a:t>4/10/2025</a:t>
+              <a:t>4/12/2025</a:t>
             </a:fld>
             <a:endParaRPr lang="en-US"/>
           </a:p>
@@ -1957,7 +1957,7 @@
           <a:p>
             <a:fld id="{546F6BE1-E150-4405-AD34-6C987C8B2B3E}" type="datetimeFigureOut">
               <a:rPr lang="en-US" smtClean="0"/>
-              <a:t>4/10/2025</a:t>
+              <a:t>4/12/2025</a:t>
             </a:fld>
             <a:endParaRPr lang="en-US"/>
           </a:p>
@@ -2070,7 +2070,7 @@
           <a:p>
             <a:fld id="{546F6BE1-E150-4405-AD34-6C987C8B2B3E}" type="datetimeFigureOut">
               <a:rPr lang="en-US" smtClean="0"/>
-              <a:t>4/10/2025</a:t>
+              <a:t>4/12/2025</a:t>
             </a:fld>
             <a:endParaRPr lang="en-US"/>
           </a:p>
@@ -2381,7 +2381,7 @@
           <a:p>
             <a:fld id="{546F6BE1-E150-4405-AD34-6C987C8B2B3E}" type="datetimeFigureOut">
               <a:rPr lang="en-US" smtClean="0"/>
-              <a:t>4/10/2025</a:t>
+              <a:t>4/12/2025</a:t>
             </a:fld>
             <a:endParaRPr lang="en-US"/>
           </a:p>
@@ -2669,7 +2669,7 @@
           <a:p>
             <a:fld id="{546F6BE1-E150-4405-AD34-6C987C8B2B3E}" type="datetimeFigureOut">
               <a:rPr lang="en-US" smtClean="0"/>
-              <a:t>4/10/2025</a:t>
+              <a:t>4/12/2025</a:t>
             </a:fld>
             <a:endParaRPr lang="en-US"/>
           </a:p>
@@ -2910,7 +2910,7 @@
           <a:p>
             <a:fld id="{546F6BE1-E150-4405-AD34-6C987C8B2B3E}" type="datetimeFigureOut">
               <a:rPr lang="en-US" smtClean="0"/>
-              <a:t>4/10/2025</a:t>
+              <a:t>4/12/2025</a:t>
             </a:fld>
             <a:endParaRPr lang="en-US"/>
           </a:p>
@@ -3327,6 +3327,41 @@
           <a:chExt cx="0" cy="0"/>
         </a:xfrm>
       </p:grpSpPr>
+      <p:sp>
+        <p:nvSpPr>
+          <p:cNvPr id="41" name="TextBox 40">
+            <a:extLst>
+              <a:ext uri="{FF2B5EF4-FFF2-40B4-BE49-F238E27FC236}">
+                <a16:creationId xmlns:a16="http://schemas.microsoft.com/office/drawing/2014/main" id="{A7980818-8D82-C635-09DA-9995EC9696E1}"/>
+              </a:ext>
+            </a:extLst>
+          </p:cNvPr>
+          <p:cNvSpPr txBox="1"/>
+          <p:nvPr/>
+        </p:nvSpPr>
+        <p:spPr>
+          <a:xfrm>
+            <a:off x="4234187" y="6110642"/>
+            <a:ext cx="3992231" cy="369332"/>
+          </a:xfrm>
+          <a:prstGeom prst="rect">
+            <a:avLst/>
+          </a:prstGeom>
+          <a:noFill/>
+        </p:spPr>
+        <p:txBody>
+          <a:bodyPr wrap="square" rtlCol="0">
+            <a:spAutoFit/>
+          </a:bodyPr>
+          <a:lstStyle/>
+          <a:p>
+            <a:r>
+              <a:rPr lang="en-US" dirty="0"/>
+              <a:t>tan(camera_angle – FOV/2) * Height</a:t>
+            </a:r>
+          </a:p>
+        </p:txBody>
+      </p:sp>
       <p:cxnSp>
         <p:nvCxnSpPr>
           <p:cNvPr id="17" name="Straight Connector 16">
@@ -4123,41 +4158,6 @@
             <a:r>
               <a:rPr lang="en-US" dirty="0"/>
               <a:t>tan(camera_angle + FOV/2) * Height</a:t>
-            </a:r>
-          </a:p>
-        </p:txBody>
-      </p:sp>
-      <p:sp>
-        <p:nvSpPr>
-          <p:cNvPr id="41" name="TextBox 40">
-            <a:extLst>
-              <a:ext uri="{FF2B5EF4-FFF2-40B4-BE49-F238E27FC236}">
-                <a16:creationId xmlns:a16="http://schemas.microsoft.com/office/drawing/2014/main" id="{A7980818-8D82-C635-09DA-9995EC9696E1}"/>
-              </a:ext>
-            </a:extLst>
-          </p:cNvPr>
-          <p:cNvSpPr txBox="1"/>
-          <p:nvPr/>
-        </p:nvSpPr>
-        <p:spPr>
-          <a:xfrm>
-            <a:off x="4234187" y="6110642"/>
-            <a:ext cx="3992231" cy="369332"/>
-          </a:xfrm>
-          <a:prstGeom prst="rect">
-            <a:avLst/>
-          </a:prstGeom>
-          <a:noFill/>
-        </p:spPr>
-        <p:txBody>
-          <a:bodyPr wrap="square" rtlCol="0">
-            <a:spAutoFit/>
-          </a:bodyPr>
-          <a:lstStyle/>
-          <a:p>
-            <a:r>
-              <a:rPr lang="en-US" dirty="0"/>
-              <a:t>tan(camera_angle – FOV/2) * Height</a:t>
             </a:r>
           </a:p>
         </p:txBody>
@@ -4878,7 +4878,7 @@
             </a:solidFill>
             <a:prstDash val="sysDot"/>
             <a:round/>
-            <a:headEnd type="stealth" w="med" len="med"/>
+            <a:headEnd type="none" w="med" len="med"/>
             <a:tailEnd type="stealth" w="med" len="med"/>
           </a:ln>
         </p:spPr>
@@ -4957,9 +4957,9 @@
           <p:nvPr/>
         </p:nvCxnSpPr>
         <p:spPr>
-          <a:xfrm flipV="1">
-            <a:off x="5427923" y="5491545"/>
-            <a:ext cx="1113897" cy="8850"/>
+          <a:xfrm>
+            <a:off x="5427923" y="5429139"/>
+            <a:ext cx="1143860" cy="0"/>
           </a:xfrm>
           <a:prstGeom prst="straightConnector1">
             <a:avLst/>
@@ -4999,9 +4999,9 @@
           <p:nvPr/>
         </p:nvCxnSpPr>
         <p:spPr>
-          <a:xfrm flipV="1">
-            <a:off x="6513686" y="5491545"/>
-            <a:ext cx="408848" cy="8850"/>
+          <a:xfrm>
+            <a:off x="6538918" y="5559387"/>
+            <a:ext cx="373783" cy="0"/>
           </a:xfrm>
           <a:prstGeom prst="straightConnector1">
             <a:avLst/>
@@ -5197,7 +5197,7 @@
         </p:nvSpPr>
         <p:spPr>
           <a:xfrm>
-            <a:off x="2548480" y="5535940"/>
+            <a:off x="2548480" y="5457284"/>
             <a:ext cx="3696493" cy="369332"/>
           </a:xfrm>
           <a:prstGeom prst="rect">
@@ -5232,7 +5232,7 @@
         </p:nvSpPr>
         <p:spPr>
           <a:xfrm>
-            <a:off x="6601219" y="5574371"/>
+            <a:off x="6522563" y="5564539"/>
             <a:ext cx="3811220" cy="369332"/>
           </a:xfrm>
           <a:prstGeom prst="rect">

</xml_diff>